<commit_message>
Fix bugs in tests and save_chartdata
Updates a number of tests that were failing because of deprecation of the 'blog' chart style, the introduce of cairo as the default device, and because of changed behaviour of grattan_save_pptx.

Also updates grattan_save and save_chartdata so it properly handles cases where grattan_save is used to output chart data and select_data is set to false.
</commit_message>
<xml_diff>
--- a/tests/testthat/temp.pptx
+++ b/tests/testthat/temp.pptx
@@ -206,7 +206,7 @@
           <a:p>
             <a:fld id="{E6375376-077A-8F42-9E71-155E70FB596E}" type="datetimeFigureOut">
               <a:rPr lang="en-US" smtClean="0"/>
-              <a:t>5/26/23</a:t>
+              <a:t>3/3/25</a:t>
             </a:fld>
             <a:endParaRPr lang="en-US"/>
           </a:p>
@@ -508,8 +508,8 @@
           <a:p>
             <a:r>
               <a:rPr/>
-              <a:t>R script location: ~/Desktop/grattantheme/data-raw/create sysdata.R
-Powerpoint file location: /Users/reysenbacht/Desktop/grattantheme/tests/testthat/temp.pptx</a:t>
+              <a:t>
+Powerpoint file location: /Users/mbbowes/Documents/GitHub/grattantheme/tests/testthat/temp.pptx</a:t>
             </a:r>
           </a:p>
         </p:txBody>
@@ -1204,7 +1204,7 @@
           <a:p>
             <a:fld id="{184C34C6-D93D-964F-98F1-8B05274CB5BF}" type="datetimeFigureOut">
               <a:rPr lang="en-US" smtClean="0"/>
-              <a:t>5/26/23</a:t>
+              <a:t>3/3/25</a:t>
             </a:fld>
             <a:endParaRPr lang="en-US"/>
           </a:p>
@@ -1425,7 +1425,7 @@
           <a:p>
             <a:fld id="{184C34C6-D93D-964F-98F1-8B05274CB5BF}" type="datetimeFigureOut">
               <a:rPr lang="en-US" smtClean="0"/>
-              <a:t>5/26/23</a:t>
+              <a:t>3/3/25</a:t>
             </a:fld>
             <a:endParaRPr lang="en-US" dirty="0"/>
           </a:p>
@@ -1749,7 +1749,7 @@
           <a:p>
             <a:fld id="{184C34C6-D93D-964F-98F1-8B05274CB5BF}" type="datetimeFigureOut">
               <a:rPr lang="en-US" smtClean="0"/>
-              <a:t>5/26/23</a:t>
+              <a:t>3/3/25</a:t>
             </a:fld>
             <a:endParaRPr lang="en-US" dirty="0"/>
           </a:p>
@@ -2266,7 +2266,7 @@
           <a:p>
             <a:fld id="{184C34C6-D93D-964F-98F1-8B05274CB5BF}" type="datetimeFigureOut">
               <a:rPr lang="en-US" smtClean="0"/>
-              <a:t>5/26/23</a:t>
+              <a:t>3/3/25</a:t>
             </a:fld>
             <a:endParaRPr lang="en-US" dirty="0"/>
           </a:p>
@@ -2605,6 +2605,69 @@
       </p:sp>
       <p:sp>
         <p:nvSpPr>
+          <p:cNvPr id="3" name="Content Placeholder 3">
+            <a:extLst>
+              <a:ext uri="{FF2B5EF4-FFF2-40B4-BE49-F238E27FC236}">
+                <a16:creationId xmlns:a16="http://schemas.microsoft.com/office/drawing/2014/main" id="{308335A6-FEDB-3236-69EC-4D55F9E69E71}"/>
+              </a:ext>
+            </a:extLst>
+          </p:cNvPr>
+          <p:cNvSpPr>
+            <a:spLocks noGrp="1"/>
+          </p:cNvSpPr>
+          <p:nvPr>
+            <p:ph sz="quarter" idx="13"/>
+          </p:nvPr>
+        </p:nvSpPr>
+        <p:spPr>
+          <a:xfrm>
+            <a:off x="536713" y="1517569"/>
+            <a:ext cx="11002617" cy="5068800"/>
+          </a:xfrm>
+        </p:spPr>
+        <p:txBody>
+          <a:bodyPr/>
+          <a:lstStyle/>
+          <a:p>
+            <a:pPr lvl="0"/>
+            <a:r>
+              <a:rPr lang="en-GB"/>
+              <a:t>Click to edit Master text styles</a:t>
+            </a:r>
+          </a:p>
+          <a:p>
+            <a:pPr lvl="1"/>
+            <a:r>
+              <a:rPr lang="en-GB"/>
+              <a:t>Second level</a:t>
+            </a:r>
+          </a:p>
+          <a:p>
+            <a:pPr lvl="2"/>
+            <a:r>
+              <a:rPr lang="en-GB"/>
+              <a:t>Third level</a:t>
+            </a:r>
+          </a:p>
+          <a:p>
+            <a:pPr lvl="3"/>
+            <a:r>
+              <a:rPr lang="en-GB"/>
+              <a:t>Fourth level</a:t>
+            </a:r>
+          </a:p>
+          <a:p>
+            <a:pPr lvl="4"/>
+            <a:r>
+              <a:rPr lang="en-GB"/>
+              <a:t>Fifth level</a:t>
+            </a:r>
+            <a:endParaRPr lang="en-AU"/>
+          </a:p>
+        </p:txBody>
+      </p:sp>
+      <p:sp>
+        <p:nvSpPr>
           <p:cNvPr id="46" name="Content Placeholder 2">
             <a:extLst>
               <a:ext uri="{FF2B5EF4-FFF2-40B4-BE49-F238E27FC236}">
@@ -2627,7 +2690,7 @@
         </p:spPr>
         <p:txBody>
           <a:bodyPr>
-            <a:noAutofit/>
+            <a:normAutofit/>
           </a:bodyPr>
           <a:lstStyle>
             <a:lvl1pPr marL="0" indent="0">
@@ -2663,16 +2726,22 @@
         </p:nvSpPr>
         <p:spPr>
           <a:xfrm>
-            <a:off x="371475" y="6609900"/>
-            <a:ext cx="10662320" cy="204762"/>
+            <a:off x="371474" y="6586456"/>
+            <a:ext cx="11412539" cy="228206"/>
           </a:xfrm>
         </p:spPr>
         <p:txBody>
-          <a:bodyPr>
+          <a:bodyPr anchor="b" anchorCtr="0">
             <a:noAutofit/>
           </a:bodyPr>
           <a:lstStyle>
             <a:lvl1pPr marL="0" indent="0">
+              <a:lnSpc>
+                <a:spcPct val="100000"/>
+              </a:lnSpc>
+              <a:spcBef>
+                <a:spcPts val="0"/>
+              </a:spcBef>
               <a:buNone/>
               <a:defRPr sz="800"/>
             </a:lvl1pPr>
@@ -2684,69 +2753,6 @@
               <a:t>Insert source and notes here</a:t>
             </a:r>
             <a:endParaRPr lang="en-AU" dirty="0"/>
-          </a:p>
-        </p:txBody>
-      </p:sp>
-      <p:sp>
-        <p:nvSpPr>
-          <p:cNvPr id="3" name="Content Placeholder 3">
-            <a:extLst>
-              <a:ext uri="{FF2B5EF4-FFF2-40B4-BE49-F238E27FC236}">
-                <a16:creationId xmlns:a16="http://schemas.microsoft.com/office/drawing/2014/main" id="{308335A6-FEDB-3236-69EC-4D55F9E69E71}"/>
-              </a:ext>
-            </a:extLst>
-          </p:cNvPr>
-          <p:cNvSpPr>
-            <a:spLocks noGrp="1"/>
-          </p:cNvSpPr>
-          <p:nvPr>
-            <p:ph sz="quarter" idx="13"/>
-          </p:nvPr>
-        </p:nvSpPr>
-        <p:spPr>
-          <a:xfrm>
-            <a:off x="536713" y="1517569"/>
-            <a:ext cx="11002617" cy="5068887"/>
-          </a:xfrm>
-        </p:spPr>
-        <p:txBody>
-          <a:bodyPr/>
-          <a:lstStyle/>
-          <a:p>
-            <a:pPr lvl="0"/>
-            <a:r>
-              <a:rPr lang="en-GB"/>
-              <a:t>Click to edit Master text styles</a:t>
-            </a:r>
-          </a:p>
-          <a:p>
-            <a:pPr lvl="1"/>
-            <a:r>
-              <a:rPr lang="en-GB"/>
-              <a:t>Second level</a:t>
-            </a:r>
-          </a:p>
-          <a:p>
-            <a:pPr lvl="2"/>
-            <a:r>
-              <a:rPr lang="en-GB"/>
-              <a:t>Third level</a:t>
-            </a:r>
-          </a:p>
-          <a:p>
-            <a:pPr lvl="3"/>
-            <a:r>
-              <a:rPr lang="en-GB"/>
-              <a:t>Fourth level</a:t>
-            </a:r>
-          </a:p>
-          <a:p>
-            <a:pPr lvl="4"/>
-            <a:r>
-              <a:rPr lang="en-GB"/>
-              <a:t>Fifth level</a:t>
-            </a:r>
-            <a:endParaRPr lang="en-AU"/>
           </a:p>
         </p:txBody>
       </p:sp>
@@ -2951,7 +2957,7 @@
           <a:p>
             <a:fld id="{184C34C6-D93D-964F-98F1-8B05274CB5BF}" type="datetimeFigureOut">
               <a:rPr lang="en-AU" noProof="0" smtClean="0"/>
-              <a:t>26/5/2023</a:t>
+              <a:t>3/3/2025</a:t>
             </a:fld>
             <a:endParaRPr lang="en-AU" noProof="0"/>
           </a:p>
@@ -3384,34 +3390,7 @@
       </p:grpSpPr>
       <p:sp>
         <p:nvSpPr>
-          <p:cNvPr id="2" name="Title 1"/>
-          <p:cNvSpPr>
-            <a:spLocks noGrp="1"/>
-          </p:cNvSpPr>
-          <p:nvPr>
-            <p:ph type="title" hasCustomPrompt="1"/>
-          </p:nvPr>
-        </p:nvSpPr>
-        <p:spPr>
-          <a:xfrm>
-            <a:off x="385482" y="367368"/>
-            <a:ext cx="9637060" cy="540145"/>
-          </a:xfrm>
-        </p:spPr>
-        <p:txBody>
-          <a:bodyPr/>
-          <a:lstStyle/>
-          <a:p>
-            <a:r>
-              <a:rPr/>
-              <a:t>My title</a:t>
-            </a:r>
-          </a:p>
-        </p:txBody>
-      </p:sp>
-      <p:sp>
-        <p:nvSpPr>
-          <p:cNvPr id="3" name="Content Placeholder 2"/>
+          <p:cNvPr id="2" name="Content Placeholder 2"/>
           <p:cNvSpPr>
             <a:spLocks noGrp="1"/>
           </p:cNvSpPr>
@@ -3436,93 +3415,30 @@
           </a:p>
         </p:txBody>
       </p:sp>
-      <p:sp>
-        <p:nvSpPr>
-          <p:cNvPr id="4" name="Caption Placeholder 1"/>
-          <p:cNvSpPr>
-            <a:spLocks noGrp="1"/>
-          </p:cNvSpPr>
-          <p:nvPr>
-            <p:ph type="body" sz="quarter" idx="11" hasCustomPrompt="1"/>
-          </p:nvPr>
-        </p:nvSpPr>
-        <p:spPr>
-          <a:xfrm>
-            <a:off x="371475" y="6609900"/>
-            <a:ext cx="10662320" cy="204762"/>
-          </a:xfrm>
-        </p:spPr>
-        <p:txBody>
-          <a:bodyPr/>
-          <a:lstStyle/>
-          <a:p>
-            <a:r>
-              <a:rPr/>
-              <a:t>Notes: notes.
-Source: source</a:t>
-            </a:r>
-          </a:p>
-        </p:txBody>
-      </p:sp>
       <p:grpSp xmlns:pic="http://schemas.openxmlformats.org/drawingml/2006/picture">
         <p:nvGrpSpPr>
-          <p:cNvPr id="5" name="Content Placeholder 3"/>
+          <p:cNvPr id="3" name="Content Placeholder 3"/>
           <p:cNvGrpSpPr/>
           <p:nvPr/>
         </p:nvGrpSpPr>
         <p:grpSpPr>
           <a:xfrm>
             <a:off x="536713" y="1517569"/>
-            <a:ext cx="11002617" cy="5068887"/>
+            <a:ext cx="11002617" cy="5068800"/>
             <a:chOff x="536713" y="1517569"/>
-            <a:chExt cx="11002617" cy="5068887"/>
+            <a:chExt cx="11002617" cy="5068800"/>
           </a:xfrm>
         </p:grpSpPr>
         <p:sp>
           <p:nvSpPr>
-            <p:cNvPr id="6" name="rc3"/>
+            <p:cNvPr id="4" name="rc3"/>
             <p:cNvSpPr/>
             <p:nvPr/>
           </p:nvSpPr>
           <p:spPr>
             <a:xfrm>
               <a:off x="536713" y="1517569"/>
-              <a:ext cx="11002617" cy="5068887"/>
-            </a:xfrm>
-            <a:prstGeom prst="rect">
-              <a:avLst/>
-            </a:prstGeom>
-            <a:solidFill>
-              <a:srgbClr val="FFFFFF">
-                <a:alpha val="100000"/>
-              </a:srgbClr>
-            </a:solidFill>
-            <a:ln w="9525" cap="rnd">
-              <a:solidFill>
-                <a:srgbClr val="FFFFFF">
-                  <a:alpha val="100000"/>
-                </a:srgbClr>
-              </a:solidFill>
-              <a:prstDash val="solid"/>
-              <a:round/>
-            </a:ln>
-          </p:spPr>
-          <p:txBody>
-            <a:bodyPr/>
-            <a:lstStyle/>
-            <a:p/>
-          </p:txBody>
-        </p:sp>
-        <p:sp>
-          <p:nvSpPr>
-            <p:cNvPr id="7" name="rc4"/>
-            <p:cNvSpPr/>
-            <p:nvPr/>
-          </p:nvSpPr>
-          <p:spPr>
-            <a:xfrm>
-              <a:off x="536713" y="1517569"/>
-              <a:ext cx="11002616" cy="5068887"/>
+              <a:ext cx="11002617" cy="5068800"/>
             </a:xfrm>
             <a:prstGeom prst="rect">
               <a:avLst/>
@@ -3550,14 +3466,14 @@
         </p:sp>
         <p:sp>
           <p:nvSpPr>
-            <p:cNvPr id="8" name="rc5"/>
+            <p:cNvPr id="5" name="rc4"/>
             <p:cNvSpPr/>
             <p:nvPr/>
           </p:nvSpPr>
           <p:spPr>
             <a:xfrm>
               <a:off x="959143" y="1587158"/>
-              <a:ext cx="10510597" cy="4596294"/>
+              <a:ext cx="10510597" cy="4596207"/>
             </a:xfrm>
             <a:prstGeom prst="rect">
               <a:avLst/>
@@ -3576,13 +3492,13 @@
         </p:sp>
         <p:sp>
           <p:nvSpPr>
-            <p:cNvPr id="9" name="pl6"/>
-            <p:cNvSpPr/>
-            <p:nvPr/>
-          </p:nvSpPr>
-          <p:spPr>
-            <a:xfrm>
-              <a:off x="959143" y="5601137"/>
+            <p:cNvPr id="6" name="pl5"/>
+            <p:cNvSpPr/>
+            <p:nvPr/>
+          </p:nvSpPr>
+          <p:spPr>
+            <a:xfrm>
+              <a:off x="959143" y="5601061"/>
               <a:ext cx="10510597" cy="0"/>
             </a:xfrm>
             <a:custGeom>
@@ -3619,13 +3535,13 @@
         </p:sp>
         <p:sp>
           <p:nvSpPr>
-            <p:cNvPr id="10" name="pl7"/>
-            <p:cNvSpPr/>
-            <p:nvPr/>
-          </p:nvSpPr>
-          <p:spPr>
-            <a:xfrm>
-              <a:off x="959143" y="4712105"/>
+            <p:cNvPr id="7" name="pl6"/>
+            <p:cNvSpPr/>
+            <p:nvPr/>
+          </p:nvSpPr>
+          <p:spPr>
+            <a:xfrm>
+              <a:off x="959143" y="4712046"/>
               <a:ext cx="10510597" cy="0"/>
             </a:xfrm>
             <a:custGeom>
@@ -3662,13 +3578,13 @@
         </p:sp>
         <p:sp>
           <p:nvSpPr>
-            <p:cNvPr id="11" name="pl8"/>
-            <p:cNvSpPr/>
-            <p:nvPr/>
-          </p:nvSpPr>
-          <p:spPr>
-            <a:xfrm>
-              <a:off x="959143" y="3823073"/>
+            <p:cNvPr id="8" name="pl7"/>
+            <p:cNvSpPr/>
+            <p:nvPr/>
+          </p:nvSpPr>
+          <p:spPr>
+            <a:xfrm>
+              <a:off x="959143" y="3823030"/>
               <a:ext cx="10510597" cy="0"/>
             </a:xfrm>
             <a:custGeom>
@@ -3705,13 +3621,13 @@
         </p:sp>
         <p:sp>
           <p:nvSpPr>
-            <p:cNvPr id="12" name="pl9"/>
-            <p:cNvSpPr/>
-            <p:nvPr/>
-          </p:nvSpPr>
-          <p:spPr>
-            <a:xfrm>
-              <a:off x="959143" y="2934041"/>
+            <p:cNvPr id="9" name="pl8"/>
+            <p:cNvSpPr/>
+            <p:nvPr/>
+          </p:nvSpPr>
+          <p:spPr>
+            <a:xfrm>
+              <a:off x="959143" y="2934015"/>
               <a:ext cx="10510597" cy="0"/>
             </a:xfrm>
             <a:custGeom>
@@ -3748,13 +3664,13 @@
         </p:sp>
         <p:sp>
           <p:nvSpPr>
-            <p:cNvPr id="13" name="pl10"/>
-            <p:cNvSpPr/>
-            <p:nvPr/>
-          </p:nvSpPr>
-          <p:spPr>
-            <a:xfrm>
-              <a:off x="959143" y="2045009"/>
+            <p:cNvPr id="10" name="pl9"/>
+            <p:cNvSpPr/>
+            <p:nvPr/>
+          </p:nvSpPr>
+          <p:spPr>
+            <a:xfrm>
+              <a:off x="959143" y="2045000"/>
               <a:ext cx="10510597" cy="0"/>
             </a:xfrm>
             <a:custGeom>
@@ -3791,21 +3707,21 @@
         </p:sp>
         <p:sp>
           <p:nvSpPr>
-            <p:cNvPr id="14" name="pl11"/>
+            <p:cNvPr id="11" name="pl10"/>
             <p:cNvSpPr/>
             <p:nvPr/>
           </p:nvSpPr>
           <p:spPr>
             <a:xfrm>
               <a:off x="1405136" y="1587158"/>
-              <a:ext cx="0" cy="4596294"/>
+              <a:ext cx="0" cy="4596207"/>
             </a:xfrm>
             <a:custGeom>
               <a:avLst/>
               <a:pathLst>
-                <a:path w="0" h="4596294">
+                <a:path w="0" h="4596207">
                   <a:moveTo>
-                    <a:pt x="0" y="4596294"/>
+                    <a:pt x="0" y="4596207"/>
                   </a:moveTo>
                   <a:lnTo>
                     <a:pt x="0" y="0"/>
@@ -3834,21 +3750,21 @@
         </p:sp>
         <p:sp>
           <p:nvSpPr>
-            <p:cNvPr id="15" name="pl12"/>
+            <p:cNvPr id="12" name="pl11"/>
             <p:cNvSpPr/>
             <p:nvPr/>
           </p:nvSpPr>
           <p:spPr>
             <a:xfrm>
               <a:off x="3848268" y="1587158"/>
-              <a:ext cx="0" cy="4596294"/>
+              <a:ext cx="0" cy="4596207"/>
             </a:xfrm>
             <a:custGeom>
               <a:avLst/>
               <a:pathLst>
-                <a:path w="0" h="4596294">
+                <a:path w="0" h="4596207">
                   <a:moveTo>
-                    <a:pt x="0" y="4596294"/>
+                    <a:pt x="0" y="4596207"/>
                   </a:moveTo>
                   <a:lnTo>
                     <a:pt x="0" y="0"/>
@@ -3877,21 +3793,21 @@
         </p:sp>
         <p:sp>
           <p:nvSpPr>
-            <p:cNvPr id="16" name="pl13"/>
+            <p:cNvPr id="13" name="pl12"/>
             <p:cNvSpPr/>
             <p:nvPr/>
           </p:nvSpPr>
           <p:spPr>
             <a:xfrm>
               <a:off x="6291400" y="1587158"/>
-              <a:ext cx="0" cy="4596294"/>
+              <a:ext cx="0" cy="4596207"/>
             </a:xfrm>
             <a:custGeom>
               <a:avLst/>
               <a:pathLst>
-                <a:path w="0" h="4596294">
+                <a:path w="0" h="4596207">
                   <a:moveTo>
-                    <a:pt x="0" y="4596294"/>
+                    <a:pt x="0" y="4596207"/>
                   </a:moveTo>
                   <a:lnTo>
                     <a:pt x="0" y="0"/>
@@ -3920,21 +3836,21 @@
         </p:sp>
         <p:sp>
           <p:nvSpPr>
-            <p:cNvPr id="17" name="pl14"/>
+            <p:cNvPr id="14" name="pl13"/>
             <p:cNvSpPr/>
             <p:nvPr/>
           </p:nvSpPr>
           <p:spPr>
             <a:xfrm>
               <a:off x="8734532" y="1587158"/>
-              <a:ext cx="0" cy="4596294"/>
+              <a:ext cx="0" cy="4596207"/>
             </a:xfrm>
             <a:custGeom>
               <a:avLst/>
               <a:pathLst>
-                <a:path w="0" h="4596294">
+                <a:path w="0" h="4596207">
                   <a:moveTo>
-                    <a:pt x="0" y="4596294"/>
+                    <a:pt x="0" y="4596207"/>
                   </a:moveTo>
                   <a:lnTo>
                     <a:pt x="0" y="0"/>
@@ -3963,21 +3879,21 @@
         </p:sp>
         <p:sp>
           <p:nvSpPr>
-            <p:cNvPr id="18" name="pl15"/>
+            <p:cNvPr id="15" name="pl14"/>
             <p:cNvSpPr/>
             <p:nvPr/>
           </p:nvSpPr>
           <p:spPr>
             <a:xfrm>
               <a:off x="11177664" y="1587158"/>
-              <a:ext cx="0" cy="4596294"/>
+              <a:ext cx="0" cy="4596207"/>
             </a:xfrm>
             <a:custGeom>
               <a:avLst/>
               <a:pathLst>
-                <a:path w="0" h="4596294">
+                <a:path w="0" h="4596207">
                   <a:moveTo>
-                    <a:pt x="0" y="4596294"/>
+                    <a:pt x="0" y="4596207"/>
                   </a:moveTo>
                   <a:lnTo>
                     <a:pt x="0" y="0"/>
@@ -4006,13 +3922,13 @@
         </p:sp>
         <p:sp>
           <p:nvSpPr>
-            <p:cNvPr id="19" name="pl16"/>
-            <p:cNvSpPr/>
-            <p:nvPr/>
-          </p:nvSpPr>
-          <p:spPr>
-            <a:xfrm>
-              <a:off x="959143" y="6045653"/>
+            <p:cNvPr id="16" name="pl15"/>
+            <p:cNvSpPr/>
+            <p:nvPr/>
+          </p:nvSpPr>
+          <p:spPr>
+            <a:xfrm>
+              <a:off x="959143" y="6045568"/>
               <a:ext cx="10510597" cy="0"/>
             </a:xfrm>
             <a:custGeom>
@@ -4049,13 +3965,13 @@
         </p:sp>
         <p:sp>
           <p:nvSpPr>
-            <p:cNvPr id="20" name="pl17"/>
-            <p:cNvSpPr/>
-            <p:nvPr/>
-          </p:nvSpPr>
-          <p:spPr>
-            <a:xfrm>
-              <a:off x="959143" y="5156621"/>
+            <p:cNvPr id="17" name="pl16"/>
+            <p:cNvSpPr/>
+            <p:nvPr/>
+          </p:nvSpPr>
+          <p:spPr>
+            <a:xfrm>
+              <a:off x="959143" y="5156553"/>
               <a:ext cx="10510597" cy="0"/>
             </a:xfrm>
             <a:custGeom>
@@ -4092,13 +4008,13 @@
         </p:sp>
         <p:sp>
           <p:nvSpPr>
-            <p:cNvPr id="21" name="pl18"/>
-            <p:cNvSpPr/>
-            <p:nvPr/>
-          </p:nvSpPr>
-          <p:spPr>
-            <a:xfrm>
-              <a:off x="959143" y="4267589"/>
+            <p:cNvPr id="18" name="pl17"/>
+            <p:cNvSpPr/>
+            <p:nvPr/>
+          </p:nvSpPr>
+          <p:spPr>
+            <a:xfrm>
+              <a:off x="959143" y="4267538"/>
               <a:ext cx="10510597" cy="0"/>
             </a:xfrm>
             <a:custGeom>
@@ -4135,13 +4051,13 @@
         </p:sp>
         <p:sp>
           <p:nvSpPr>
-            <p:cNvPr id="22" name="pl19"/>
-            <p:cNvSpPr/>
-            <p:nvPr/>
-          </p:nvSpPr>
-          <p:spPr>
-            <a:xfrm>
-              <a:off x="959143" y="3378557"/>
+            <p:cNvPr id="19" name="pl18"/>
+            <p:cNvSpPr/>
+            <p:nvPr/>
+          </p:nvSpPr>
+          <p:spPr>
+            <a:xfrm>
+              <a:off x="959143" y="3378523"/>
               <a:ext cx="10510597" cy="0"/>
             </a:xfrm>
             <a:custGeom>
@@ -4178,13 +4094,13 @@
         </p:sp>
         <p:sp>
           <p:nvSpPr>
-            <p:cNvPr id="23" name="pl20"/>
-            <p:cNvSpPr/>
-            <p:nvPr/>
-          </p:nvSpPr>
-          <p:spPr>
-            <a:xfrm>
-              <a:off x="959143" y="2489525"/>
+            <p:cNvPr id="20" name="pl19"/>
+            <p:cNvSpPr/>
+            <p:nvPr/>
+          </p:nvSpPr>
+          <p:spPr>
+            <a:xfrm>
+              <a:off x="959143" y="2489508"/>
               <a:ext cx="10510597" cy="0"/>
             </a:xfrm>
             <a:custGeom>
@@ -4221,7 +4137,7 @@
         </p:sp>
         <p:sp>
           <p:nvSpPr>
-            <p:cNvPr id="24" name="pl21"/>
+            <p:cNvPr id="21" name="pl20"/>
             <p:cNvSpPr/>
             <p:nvPr/>
           </p:nvSpPr>
@@ -4264,21 +4180,21 @@
         </p:sp>
         <p:sp>
           <p:nvSpPr>
-            <p:cNvPr id="25" name="pl22"/>
+            <p:cNvPr id="22" name="pl21"/>
             <p:cNvSpPr/>
             <p:nvPr/>
           </p:nvSpPr>
           <p:spPr>
             <a:xfrm>
               <a:off x="2626702" y="1587158"/>
-              <a:ext cx="0" cy="4596294"/>
+              <a:ext cx="0" cy="4596207"/>
             </a:xfrm>
             <a:custGeom>
               <a:avLst/>
               <a:pathLst>
-                <a:path w="0" h="4596294">
+                <a:path w="0" h="4596207">
                   <a:moveTo>
-                    <a:pt x="0" y="4596294"/>
+                    <a:pt x="0" y="4596207"/>
                   </a:moveTo>
                   <a:lnTo>
                     <a:pt x="0" y="0"/>
@@ -4307,21 +4223,21 @@
         </p:sp>
         <p:sp>
           <p:nvSpPr>
-            <p:cNvPr id="26" name="pl23"/>
+            <p:cNvPr id="23" name="pl22"/>
             <p:cNvSpPr/>
             <p:nvPr/>
           </p:nvSpPr>
           <p:spPr>
             <a:xfrm>
               <a:off x="5069834" y="1587158"/>
-              <a:ext cx="0" cy="4596294"/>
+              <a:ext cx="0" cy="4596207"/>
             </a:xfrm>
             <a:custGeom>
               <a:avLst/>
               <a:pathLst>
-                <a:path w="0" h="4596294">
+                <a:path w="0" h="4596207">
                   <a:moveTo>
-                    <a:pt x="0" y="4596294"/>
+                    <a:pt x="0" y="4596207"/>
                   </a:moveTo>
                   <a:lnTo>
                     <a:pt x="0" y="0"/>
@@ -4350,21 +4266,21 @@
         </p:sp>
         <p:sp>
           <p:nvSpPr>
-            <p:cNvPr id="27" name="pl24"/>
+            <p:cNvPr id="24" name="pl23"/>
             <p:cNvSpPr/>
             <p:nvPr/>
           </p:nvSpPr>
           <p:spPr>
             <a:xfrm>
               <a:off x="7512966" y="1587158"/>
-              <a:ext cx="0" cy="4596294"/>
+              <a:ext cx="0" cy="4596207"/>
             </a:xfrm>
             <a:custGeom>
               <a:avLst/>
               <a:pathLst>
-                <a:path w="0" h="4596294">
+                <a:path w="0" h="4596207">
                   <a:moveTo>
-                    <a:pt x="0" y="4596294"/>
+                    <a:pt x="0" y="4596207"/>
                   </a:moveTo>
                   <a:lnTo>
                     <a:pt x="0" y="0"/>
@@ -4393,21 +4309,21 @@
         </p:sp>
         <p:sp>
           <p:nvSpPr>
-            <p:cNvPr id="28" name="pl25"/>
+            <p:cNvPr id="25" name="pl24"/>
             <p:cNvSpPr/>
             <p:nvPr/>
           </p:nvSpPr>
           <p:spPr>
             <a:xfrm>
               <a:off x="9956098" y="1587158"/>
-              <a:ext cx="0" cy="4596294"/>
+              <a:ext cx="0" cy="4596207"/>
             </a:xfrm>
             <a:custGeom>
               <a:avLst/>
               <a:pathLst>
-                <a:path w="0" h="4596294">
+                <a:path w="0" h="4596207">
                   <a:moveTo>
-                    <a:pt x="0" y="4596294"/>
+                    <a:pt x="0" y="4596207"/>
                   </a:moveTo>
                   <a:lnTo>
                     <a:pt x="0" y="0"/>
@@ -4436,13 +4352,13 @@
         </p:sp>
         <p:sp>
           <p:nvSpPr>
-            <p:cNvPr id="29" name="pt26"/>
-            <p:cNvSpPr/>
-            <p:nvPr/>
-          </p:nvSpPr>
-          <p:spPr>
-            <a:xfrm>
-              <a:off x="4108369" y="4056707"/>
+            <p:cNvPr id="26" name="pt25"/>
+            <p:cNvSpPr/>
+            <p:nvPr/>
+          </p:nvSpPr>
+          <p:spPr>
+            <a:xfrm>
+              <a:off x="4108369" y="4056660"/>
               <a:ext cx="66150" cy="66150"/>
             </a:xfrm>
             <a:prstGeom prst="ellipse">
@@ -4471,13 +4387,13 @@
         </p:sp>
         <p:sp>
           <p:nvSpPr>
-            <p:cNvPr id="30" name="pt27"/>
-            <p:cNvSpPr/>
-            <p:nvPr/>
-          </p:nvSpPr>
-          <p:spPr>
-            <a:xfrm>
-              <a:off x="4731368" y="4056707"/>
+            <p:cNvPr id="27" name="pt26"/>
+            <p:cNvSpPr/>
+            <p:nvPr/>
+          </p:nvSpPr>
+          <p:spPr>
+            <a:xfrm>
+              <a:off x="4731368" y="4056660"/>
               <a:ext cx="66150" cy="66150"/>
             </a:xfrm>
             <a:prstGeom prst="ellipse">
@@ -4506,13 +4422,13 @@
         </p:sp>
         <p:sp>
           <p:nvSpPr>
-            <p:cNvPr id="31" name="pt28"/>
-            <p:cNvSpPr/>
-            <p:nvPr/>
-          </p:nvSpPr>
-          <p:spPr>
-            <a:xfrm>
-              <a:off x="3375429" y="3736656"/>
+            <p:cNvPr id="28" name="pt27"/>
+            <p:cNvSpPr/>
+            <p:nvPr/>
+          </p:nvSpPr>
+          <p:spPr>
+            <a:xfrm>
+              <a:off x="3375429" y="3736615"/>
               <a:ext cx="66150" cy="66150"/>
             </a:xfrm>
             <a:prstGeom prst="ellipse">
@@ -4541,13 +4457,13 @@
         </p:sp>
         <p:sp>
           <p:nvSpPr>
-            <p:cNvPr id="32" name="pt29"/>
-            <p:cNvSpPr/>
-            <p:nvPr/>
-          </p:nvSpPr>
-          <p:spPr>
-            <a:xfrm>
-              <a:off x="5562033" y="3985585"/>
+            <p:cNvPr id="29" name="pt28"/>
+            <p:cNvSpPr/>
+            <p:nvPr/>
+          </p:nvSpPr>
+          <p:spPr>
+            <a:xfrm>
+              <a:off x="5562033" y="3985539"/>
               <a:ext cx="66150" cy="66150"/>
             </a:xfrm>
             <a:prstGeom prst="ellipse">
@@ -4576,13 +4492,13 @@
         </p:sp>
         <p:sp>
           <p:nvSpPr>
-            <p:cNvPr id="33" name="pt30"/>
-            <p:cNvSpPr/>
-            <p:nvPr/>
-          </p:nvSpPr>
-          <p:spPr>
-            <a:xfrm>
-              <a:off x="6111737" y="4465662"/>
+            <p:cNvPr id="30" name="pt29"/>
+            <p:cNvSpPr/>
+            <p:nvPr/>
+          </p:nvSpPr>
+          <p:spPr>
+            <a:xfrm>
+              <a:off x="6111737" y="4465607"/>
               <a:ext cx="66150" cy="66150"/>
             </a:xfrm>
             <a:prstGeom prst="ellipse">
@@ -4611,13 +4527,13 @@
         </p:sp>
         <p:sp>
           <p:nvSpPr>
-            <p:cNvPr id="34" name="pt31"/>
-            <p:cNvSpPr/>
-            <p:nvPr/>
-          </p:nvSpPr>
-          <p:spPr>
-            <a:xfrm>
-              <a:off x="6160600" y="4572346"/>
+            <p:cNvPr id="31" name="pt30"/>
+            <p:cNvSpPr/>
+            <p:nvPr/>
+          </p:nvSpPr>
+          <p:spPr>
+            <a:xfrm>
+              <a:off x="6160600" y="4572289"/>
               <a:ext cx="66150" cy="66150"/>
             </a:xfrm>
             <a:prstGeom prst="ellipse">
@@ -4646,13 +4562,13 @@
         </p:sp>
         <p:sp>
           <p:nvSpPr>
-            <p:cNvPr id="35" name="pt32"/>
-            <p:cNvSpPr/>
-            <p:nvPr/>
-          </p:nvSpPr>
-          <p:spPr>
-            <a:xfrm>
-              <a:off x="6429344" y="5248010"/>
+            <p:cNvPr id="32" name="pt31"/>
+            <p:cNvSpPr/>
+            <p:nvPr/>
+          </p:nvSpPr>
+          <p:spPr>
+            <a:xfrm>
+              <a:off x="6429344" y="5247940"/>
               <a:ext cx="66150" cy="66150"/>
             </a:xfrm>
             <a:prstGeom prst="ellipse">
@@ -4681,13 +4597,13 @@
         </p:sp>
         <p:sp>
           <p:nvSpPr>
-            <p:cNvPr id="36" name="pt33"/>
-            <p:cNvSpPr/>
-            <p:nvPr/>
-          </p:nvSpPr>
-          <p:spPr>
-            <a:xfrm>
-              <a:off x="5500954" y="3452166"/>
+            <p:cNvPr id="33" name="pt32"/>
+            <p:cNvSpPr/>
+            <p:nvPr/>
+          </p:nvSpPr>
+          <p:spPr>
+            <a:xfrm>
+              <a:off x="5500954" y="3452130"/>
               <a:ext cx="66150" cy="66150"/>
             </a:xfrm>
             <a:prstGeom prst="ellipse">
@@ -4716,13 +4632,13 @@
         </p:sp>
         <p:sp>
           <p:nvSpPr>
-            <p:cNvPr id="37" name="pt34"/>
-            <p:cNvSpPr/>
-            <p:nvPr/>
-          </p:nvSpPr>
-          <p:spPr>
-            <a:xfrm>
-              <a:off x="5403229" y="3736656"/>
+            <p:cNvPr id="34" name="pt33"/>
+            <p:cNvSpPr/>
+            <p:nvPr/>
+          </p:nvSpPr>
+          <p:spPr>
+            <a:xfrm>
+              <a:off x="5403229" y="3736615"/>
               <a:ext cx="66150" cy="66150"/>
             </a:xfrm>
             <a:prstGeom prst="ellipse">
@@ -4751,13 +4667,13 @@
         </p:sp>
         <p:sp>
           <p:nvSpPr>
-            <p:cNvPr id="38" name="pt35"/>
-            <p:cNvSpPr/>
-            <p:nvPr/>
-          </p:nvSpPr>
-          <p:spPr>
-            <a:xfrm>
-              <a:off x="6111737" y="4376759"/>
+            <p:cNvPr id="35" name="pt34"/>
+            <p:cNvSpPr/>
+            <p:nvPr/>
+          </p:nvSpPr>
+          <p:spPr>
+            <a:xfrm>
+              <a:off x="6111737" y="4376705"/>
               <a:ext cx="66150" cy="66150"/>
             </a:xfrm>
             <a:prstGeom prst="ellipse">
@@ -4786,13 +4702,13 @@
         </p:sp>
         <p:sp>
           <p:nvSpPr>
-            <p:cNvPr id="39" name="pt36"/>
-            <p:cNvSpPr/>
-            <p:nvPr/>
-          </p:nvSpPr>
-          <p:spPr>
-            <a:xfrm>
-              <a:off x="6111737" y="4625688"/>
+            <p:cNvPr id="36" name="pt35"/>
+            <p:cNvSpPr/>
+            <p:nvPr/>
+          </p:nvSpPr>
+          <p:spPr>
+            <a:xfrm>
+              <a:off x="6111737" y="4625630"/>
               <a:ext cx="66150" cy="66150"/>
             </a:xfrm>
             <a:prstGeom prst="ellipse">
@@ -4821,13 +4737,13 @@
         </p:sp>
         <p:sp>
           <p:nvSpPr>
-            <p:cNvPr id="40" name="pt37"/>
-            <p:cNvSpPr/>
-            <p:nvPr/>
-          </p:nvSpPr>
-          <p:spPr>
-            <a:xfrm>
-              <a:off x="7650910" y="4874617"/>
+            <p:cNvPr id="37" name="pt36"/>
+            <p:cNvSpPr/>
+            <p:nvPr/>
+          </p:nvSpPr>
+          <p:spPr>
+            <a:xfrm>
+              <a:off x="7650910" y="4874554"/>
               <a:ext cx="66150" cy="66150"/>
             </a:xfrm>
             <a:prstGeom prst="ellipse">
@@ -4856,13 +4772,13 @@
         </p:sp>
         <p:sp>
           <p:nvSpPr>
-            <p:cNvPr id="41" name="pt38"/>
-            <p:cNvSpPr/>
-            <p:nvPr/>
-          </p:nvSpPr>
-          <p:spPr>
-            <a:xfrm>
-              <a:off x="6820246" y="4714591"/>
+            <p:cNvPr id="38" name="pt37"/>
+            <p:cNvSpPr/>
+            <p:nvPr/>
+          </p:nvSpPr>
+          <p:spPr>
+            <a:xfrm>
+              <a:off x="6820246" y="4714531"/>
               <a:ext cx="66150" cy="66150"/>
             </a:xfrm>
             <a:prstGeom prst="ellipse">
@@ -4891,13 +4807,13 @@
         </p:sp>
         <p:sp>
           <p:nvSpPr>
-            <p:cNvPr id="42" name="pt39"/>
-            <p:cNvSpPr/>
-            <p:nvPr/>
-          </p:nvSpPr>
-          <p:spPr>
-            <a:xfrm>
-              <a:off x="6942402" y="5087984"/>
+            <p:cNvPr id="39" name="pt38"/>
+            <p:cNvSpPr/>
+            <p:nvPr/>
+          </p:nvSpPr>
+          <p:spPr>
+            <a:xfrm>
+              <a:off x="6942402" y="5087917"/>
               <a:ext cx="66150" cy="66150"/>
             </a:xfrm>
             <a:prstGeom prst="ellipse">
@@ -4926,13 +4842,13 @@
         </p:sp>
         <p:sp>
           <p:nvSpPr>
-            <p:cNvPr id="43" name="pt40"/>
-            <p:cNvSpPr/>
-            <p:nvPr/>
-          </p:nvSpPr>
-          <p:spPr>
-            <a:xfrm>
-              <a:off x="10533806" y="5941455"/>
+            <p:cNvPr id="40" name="pt39"/>
+            <p:cNvSpPr/>
+            <p:nvPr/>
+          </p:nvSpPr>
+          <p:spPr>
+            <a:xfrm>
+              <a:off x="10533806" y="5941372"/>
               <a:ext cx="66150" cy="66150"/>
             </a:xfrm>
             <a:prstGeom prst="ellipse">
@@ -4961,13 +4877,13 @@
         </p:sp>
         <p:sp>
           <p:nvSpPr>
-            <p:cNvPr id="44" name="pt41"/>
-            <p:cNvSpPr/>
-            <p:nvPr/>
-          </p:nvSpPr>
-          <p:spPr>
-            <a:xfrm>
-              <a:off x="10958911" y="5941455"/>
+            <p:cNvPr id="41" name="pt40"/>
+            <p:cNvSpPr/>
+            <p:nvPr/>
+          </p:nvSpPr>
+          <p:spPr>
+            <a:xfrm>
+              <a:off x="10958911" y="5941372"/>
               <a:ext cx="66150" cy="66150"/>
             </a:xfrm>
             <a:prstGeom prst="ellipse">
@@ -4996,13 +4912,13 @@
         </p:sp>
         <p:sp>
           <p:nvSpPr>
-            <p:cNvPr id="45" name="pt42"/>
-            <p:cNvSpPr/>
-            <p:nvPr/>
-          </p:nvSpPr>
-          <p:spPr>
-            <a:xfrm>
-              <a:off x="10765904" y="5176888"/>
+            <p:cNvPr id="42" name="pt41"/>
+            <p:cNvSpPr/>
+            <p:nvPr/>
+          </p:nvSpPr>
+          <p:spPr>
+            <a:xfrm>
+              <a:off x="10765904" y="5176819"/>
               <a:ext cx="66150" cy="66150"/>
             </a:xfrm>
             <a:prstGeom prst="ellipse">
@@ -5031,13 +4947,13 @@
         </p:sp>
         <p:sp>
           <p:nvSpPr>
-            <p:cNvPr id="46" name="pt43"/>
-            <p:cNvSpPr/>
-            <p:nvPr/>
-          </p:nvSpPr>
-          <p:spPr>
-            <a:xfrm>
-              <a:off x="3082254" y="2029715"/>
+            <p:cNvPr id="43" name="pt42"/>
+            <p:cNvSpPr/>
+            <p:nvPr/>
+          </p:nvSpPr>
+          <p:spPr>
+            <a:xfrm>
+              <a:off x="3082254" y="2029706"/>
               <a:ext cx="66150" cy="66150"/>
             </a:xfrm>
             <a:prstGeom prst="ellipse">
@@ -5066,13 +4982,13 @@
         </p:sp>
         <p:sp>
           <p:nvSpPr>
-            <p:cNvPr id="47" name="pt44"/>
-            <p:cNvSpPr/>
-            <p:nvPr/>
-          </p:nvSpPr>
-          <p:spPr>
-            <a:xfrm>
-              <a:off x="1653021" y="2385327"/>
+            <p:cNvPr id="44" name="pt43"/>
+            <p:cNvSpPr/>
+            <p:nvPr/>
+          </p:nvSpPr>
+          <p:spPr>
+            <a:xfrm>
+              <a:off x="1653021" y="2385312"/>
               <a:ext cx="66150" cy="66150"/>
             </a:xfrm>
             <a:prstGeom prst="ellipse">
@@ -5101,13 +5017,13 @@
         </p:sp>
         <p:sp>
           <p:nvSpPr>
-            <p:cNvPr id="48" name="pt45"/>
-            <p:cNvSpPr/>
-            <p:nvPr/>
-          </p:nvSpPr>
-          <p:spPr>
-            <a:xfrm>
-              <a:off x="2190510" y="1763005"/>
+            <p:cNvPr id="45" name="pt44"/>
+            <p:cNvSpPr/>
+            <p:nvPr/>
+          </p:nvSpPr>
+          <p:spPr>
+            <a:xfrm>
+              <a:off x="2190510" y="1763001"/>
               <a:ext cx="66150" cy="66150"/>
             </a:xfrm>
             <a:prstGeom prst="ellipse">
@@ -5136,13 +5052,13 @@
         </p:sp>
         <p:sp>
           <p:nvSpPr>
-            <p:cNvPr id="49" name="pt46"/>
-            <p:cNvSpPr/>
-            <p:nvPr/>
-          </p:nvSpPr>
-          <p:spPr>
-            <a:xfrm>
-              <a:off x="3729684" y="3967804"/>
+            <p:cNvPr id="46" name="pt45"/>
+            <p:cNvSpPr/>
+            <p:nvPr/>
+          </p:nvSpPr>
+          <p:spPr>
+            <a:xfrm>
+              <a:off x="3729684" y="3967758"/>
               <a:ext cx="66150" cy="66150"/>
             </a:xfrm>
             <a:prstGeom prst="ellipse">
@@ -5171,13 +5087,13 @@
         </p:sp>
         <p:sp>
           <p:nvSpPr>
-            <p:cNvPr id="50" name="pt47"/>
-            <p:cNvSpPr/>
-            <p:nvPr/>
-          </p:nvSpPr>
-          <p:spPr>
-            <a:xfrm>
-              <a:off x="6307188" y="5034642"/>
+            <p:cNvPr id="47" name="pt46"/>
+            <p:cNvSpPr/>
+            <p:nvPr/>
+          </p:nvSpPr>
+          <p:spPr>
+            <a:xfrm>
+              <a:off x="6307188" y="5034577"/>
               <a:ext cx="66150" cy="66150"/>
             </a:xfrm>
             <a:prstGeom prst="ellipse">
@@ -5206,13 +5122,13 @@
         </p:sp>
         <p:sp>
           <p:nvSpPr>
-            <p:cNvPr id="51" name="pt48"/>
-            <p:cNvSpPr/>
-            <p:nvPr/>
-          </p:nvSpPr>
-          <p:spPr>
-            <a:xfrm>
-              <a:off x="6099522" y="5087984"/>
+            <p:cNvPr id="48" name="pt47"/>
+            <p:cNvSpPr/>
+            <p:nvPr/>
+          </p:nvSpPr>
+          <p:spPr>
+            <a:xfrm>
+              <a:off x="6099522" y="5087917"/>
               <a:ext cx="66150" cy="66150"/>
             </a:xfrm>
             <a:prstGeom prst="ellipse">
@@ -5241,13 +5157,13 @@
         </p:sp>
         <p:sp>
           <p:nvSpPr>
-            <p:cNvPr id="52" name="pt49"/>
-            <p:cNvSpPr/>
-            <p:nvPr/>
-          </p:nvSpPr>
-          <p:spPr>
-            <a:xfrm>
-              <a:off x="7088990" y="5425816"/>
+            <p:cNvPr id="49" name="pt48"/>
+            <p:cNvSpPr/>
+            <p:nvPr/>
+          </p:nvSpPr>
+          <p:spPr>
+            <a:xfrm>
+              <a:off x="7088990" y="5425743"/>
               <a:ext cx="66150" cy="66150"/>
             </a:xfrm>
             <a:prstGeom prst="ellipse">
@@ -5276,13 +5192,13 @@
         </p:sp>
         <p:sp>
           <p:nvSpPr>
-            <p:cNvPr id="53" name="pt50"/>
-            <p:cNvSpPr/>
-            <p:nvPr/>
-          </p:nvSpPr>
-          <p:spPr>
-            <a:xfrm>
-              <a:off x="7101206" y="4376759"/>
+            <p:cNvPr id="50" name="pt49"/>
+            <p:cNvSpPr/>
+            <p:nvPr/>
+          </p:nvSpPr>
+          <p:spPr>
+            <a:xfrm>
+              <a:off x="7101206" y="4376705"/>
               <a:ext cx="66150" cy="66150"/>
             </a:xfrm>
             <a:prstGeom prst="ellipse">
@@ -5311,13 +5227,13 @@
         </p:sp>
         <p:sp>
           <p:nvSpPr>
-            <p:cNvPr id="54" name="pt51"/>
-            <p:cNvSpPr/>
-            <p:nvPr/>
-          </p:nvSpPr>
-          <p:spPr>
-            <a:xfrm>
-              <a:off x="2434824" y="2936527"/>
+            <p:cNvPr id="51" name="pt50"/>
+            <p:cNvSpPr/>
+            <p:nvPr/>
+          </p:nvSpPr>
+          <p:spPr>
+            <a:xfrm>
+              <a:off x="2434824" y="2936501"/>
               <a:ext cx="66150" cy="66150"/>
             </a:xfrm>
             <a:prstGeom prst="ellipse">
@@ -5346,13 +5262,13 @@
         </p:sp>
         <p:sp>
           <p:nvSpPr>
-            <p:cNvPr id="55" name="pt52"/>
-            <p:cNvSpPr/>
-            <p:nvPr/>
-          </p:nvSpPr>
-          <p:spPr>
-            <a:xfrm>
-              <a:off x="2935666" y="3167675"/>
+            <p:cNvPr id="52" name="pt51"/>
+            <p:cNvSpPr/>
+            <p:nvPr/>
+          </p:nvSpPr>
+          <p:spPr>
+            <a:xfrm>
+              <a:off x="2935666" y="3167645"/>
               <a:ext cx="66150" cy="66150"/>
             </a:xfrm>
             <a:prstGeom prst="ellipse">
@@ -5381,13 +5297,13 @@
         </p:sp>
         <p:sp>
           <p:nvSpPr>
-            <p:cNvPr id="56" name="pt53"/>
-            <p:cNvSpPr/>
-            <p:nvPr/>
-          </p:nvSpPr>
-          <p:spPr>
-            <a:xfrm>
-              <a:off x="1403822" y="2385327"/>
+            <p:cNvPr id="53" name="pt52"/>
+            <p:cNvSpPr/>
+            <p:nvPr/>
+          </p:nvSpPr>
+          <p:spPr>
+            <a:xfrm>
+              <a:off x="1403822" y="2385312"/>
               <a:ext cx="66150" cy="66150"/>
             </a:xfrm>
             <a:prstGeom prst="ellipse">
@@ -5416,13 +5332,13 @@
         </p:sp>
         <p:sp>
           <p:nvSpPr>
-            <p:cNvPr id="57" name="pt54"/>
-            <p:cNvSpPr/>
-            <p:nvPr/>
-          </p:nvSpPr>
-          <p:spPr>
-            <a:xfrm>
-              <a:off x="5452092" y="4981301"/>
+            <p:cNvPr id="54" name="pt53"/>
+            <p:cNvSpPr/>
+            <p:nvPr/>
+          </p:nvSpPr>
+          <p:spPr>
+            <a:xfrm>
+              <a:off x="5452092" y="4981236"/>
               <a:ext cx="66150" cy="66150"/>
             </a:xfrm>
             <a:prstGeom prst="ellipse">
@@ -5451,13 +5367,13 @@
         </p:sp>
         <p:sp>
           <p:nvSpPr>
-            <p:cNvPr id="58" name="pt55"/>
-            <p:cNvSpPr/>
-            <p:nvPr/>
-          </p:nvSpPr>
-          <p:spPr>
-            <a:xfrm>
-              <a:off x="4474839" y="4287856"/>
+            <p:cNvPr id="55" name="pt54"/>
+            <p:cNvSpPr/>
+            <p:nvPr/>
+          </p:nvSpPr>
+          <p:spPr>
+            <a:xfrm>
+              <a:off x="4474839" y="4287804"/>
               <a:ext cx="66150" cy="66150"/>
             </a:xfrm>
             <a:prstGeom prst="ellipse">
@@ -5486,13 +5402,13 @@
         </p:sp>
         <p:sp>
           <p:nvSpPr>
-            <p:cNvPr id="59" name="pt56"/>
-            <p:cNvSpPr/>
-            <p:nvPr/>
-          </p:nvSpPr>
-          <p:spPr>
-            <a:xfrm>
-              <a:off x="6429344" y="5123546"/>
+            <p:cNvPr id="56" name="pt55"/>
+            <p:cNvSpPr/>
+            <p:nvPr/>
+          </p:nvSpPr>
+          <p:spPr>
+            <a:xfrm>
+              <a:off x="6429344" y="5123478"/>
               <a:ext cx="66150" cy="66150"/>
             </a:xfrm>
             <a:prstGeom prst="ellipse">
@@ -5521,13 +5437,13 @@
         </p:sp>
         <p:sp>
           <p:nvSpPr>
-            <p:cNvPr id="60" name="pt57"/>
-            <p:cNvSpPr/>
-            <p:nvPr/>
-          </p:nvSpPr>
-          <p:spPr>
-            <a:xfrm>
-              <a:off x="4499270" y="3985585"/>
+            <p:cNvPr id="57" name="pt56"/>
+            <p:cNvSpPr/>
+            <p:nvPr/>
+          </p:nvSpPr>
+          <p:spPr>
+            <a:xfrm>
+              <a:off x="4499270" y="3985539"/>
               <a:ext cx="66150" cy="66150"/>
             </a:xfrm>
             <a:prstGeom prst="ellipse">
@@ -5556,13 +5472,13 @@
         </p:sp>
         <p:sp>
           <p:nvSpPr>
-            <p:cNvPr id="61" name="tx58"/>
-            <p:cNvSpPr/>
-            <p:nvPr/>
-          </p:nvSpPr>
-          <p:spPr>
-            <a:xfrm>
-              <a:off x="772201" y="6005462"/>
+            <p:cNvPr id="58" name="tx57"/>
+            <p:cNvSpPr/>
+            <p:nvPr/>
+          </p:nvSpPr>
+          <p:spPr>
+            <a:xfrm>
+              <a:off x="772201" y="6005377"/>
               <a:ext cx="124311" cy="80272"/>
             </a:xfrm>
             <a:prstGeom prst="rect">
@@ -5602,13 +5518,13 @@
         </p:sp>
         <p:sp>
           <p:nvSpPr>
-            <p:cNvPr id="62" name="tx59"/>
-            <p:cNvSpPr/>
-            <p:nvPr/>
-          </p:nvSpPr>
-          <p:spPr>
-            <a:xfrm>
-              <a:off x="772201" y="5116921"/>
+            <p:cNvPr id="59" name="tx58"/>
+            <p:cNvSpPr/>
+            <p:nvPr/>
+          </p:nvSpPr>
+          <p:spPr>
+            <a:xfrm>
+              <a:off x="772201" y="5116853"/>
               <a:ext cx="124311" cy="79781"/>
             </a:xfrm>
             <a:prstGeom prst="rect">
@@ -5648,13 +5564,13 @@
         </p:sp>
         <p:sp>
           <p:nvSpPr>
-            <p:cNvPr id="63" name="tx60"/>
-            <p:cNvSpPr/>
-            <p:nvPr/>
-          </p:nvSpPr>
-          <p:spPr>
-            <a:xfrm>
-              <a:off x="772201" y="4227125"/>
+            <p:cNvPr id="60" name="tx59"/>
+            <p:cNvSpPr/>
+            <p:nvPr/>
+          </p:nvSpPr>
+          <p:spPr>
+            <a:xfrm>
+              <a:off x="772201" y="4227074"/>
               <a:ext cx="124311" cy="80545"/>
             </a:xfrm>
             <a:prstGeom prst="rect">
@@ -5694,13 +5610,13 @@
         </p:sp>
         <p:sp>
           <p:nvSpPr>
-            <p:cNvPr id="64" name="tx61"/>
-            <p:cNvSpPr/>
-            <p:nvPr/>
-          </p:nvSpPr>
-          <p:spPr>
-            <a:xfrm>
-              <a:off x="772201" y="3338257"/>
+            <p:cNvPr id="61" name="tx60"/>
+            <p:cNvSpPr/>
+            <p:nvPr/>
+          </p:nvSpPr>
+          <p:spPr>
+            <a:xfrm>
+              <a:off x="772201" y="3338223"/>
               <a:ext cx="124311" cy="80382"/>
             </a:xfrm>
             <a:prstGeom prst="rect">
@@ -5740,13 +5656,13 @@
         </p:sp>
         <p:sp>
           <p:nvSpPr>
-            <p:cNvPr id="65" name="tx62"/>
-            <p:cNvSpPr/>
-            <p:nvPr/>
-          </p:nvSpPr>
-          <p:spPr>
-            <a:xfrm>
-              <a:off x="772201" y="2449225"/>
+            <p:cNvPr id="62" name="tx61"/>
+            <p:cNvSpPr/>
+            <p:nvPr/>
+          </p:nvSpPr>
+          <p:spPr>
+            <a:xfrm>
+              <a:off x="772201" y="2449208"/>
               <a:ext cx="124311" cy="80382"/>
             </a:xfrm>
             <a:prstGeom prst="rect">
@@ -5786,7 +5702,7 @@
         </p:sp>
         <p:sp>
           <p:nvSpPr>
-            <p:cNvPr id="66" name="tx63"/>
+            <p:cNvPr id="63" name="tx62"/>
             <p:cNvSpPr/>
             <p:nvPr/>
           </p:nvSpPr>
@@ -5832,13 +5748,13 @@
         </p:sp>
         <p:sp>
           <p:nvSpPr>
-            <p:cNvPr id="67" name="pl64"/>
-            <p:cNvSpPr/>
-            <p:nvPr/>
-          </p:nvSpPr>
-          <p:spPr>
-            <a:xfrm>
-              <a:off x="924348" y="6045653"/>
+            <p:cNvPr id="64" name="pl63"/>
+            <p:cNvSpPr/>
+            <p:nvPr/>
+          </p:nvSpPr>
+          <p:spPr>
+            <a:xfrm>
+              <a:off x="924348" y="6045568"/>
               <a:ext cx="34794" cy="0"/>
             </a:xfrm>
             <a:custGeom>
@@ -5872,13 +5788,13 @@
         </p:sp>
         <p:sp>
           <p:nvSpPr>
-            <p:cNvPr id="68" name="pl65"/>
-            <p:cNvSpPr/>
-            <p:nvPr/>
-          </p:nvSpPr>
-          <p:spPr>
-            <a:xfrm>
-              <a:off x="924348" y="5156621"/>
+            <p:cNvPr id="65" name="pl64"/>
+            <p:cNvSpPr/>
+            <p:nvPr/>
+          </p:nvSpPr>
+          <p:spPr>
+            <a:xfrm>
+              <a:off x="924348" y="5156553"/>
               <a:ext cx="34794" cy="0"/>
             </a:xfrm>
             <a:custGeom>
@@ -5912,13 +5828,13 @@
         </p:sp>
         <p:sp>
           <p:nvSpPr>
-            <p:cNvPr id="69" name="pl66"/>
-            <p:cNvSpPr/>
-            <p:nvPr/>
-          </p:nvSpPr>
-          <p:spPr>
-            <a:xfrm>
-              <a:off x="924348" y="4267589"/>
+            <p:cNvPr id="66" name="pl65"/>
+            <p:cNvSpPr/>
+            <p:nvPr/>
+          </p:nvSpPr>
+          <p:spPr>
+            <a:xfrm>
+              <a:off x="924348" y="4267538"/>
               <a:ext cx="34794" cy="0"/>
             </a:xfrm>
             <a:custGeom>
@@ -5952,13 +5868,13 @@
         </p:sp>
         <p:sp>
           <p:nvSpPr>
-            <p:cNvPr id="70" name="pl67"/>
-            <p:cNvSpPr/>
-            <p:nvPr/>
-          </p:nvSpPr>
-          <p:spPr>
-            <a:xfrm>
-              <a:off x="924348" y="3378557"/>
+            <p:cNvPr id="67" name="pl66"/>
+            <p:cNvSpPr/>
+            <p:nvPr/>
+          </p:nvSpPr>
+          <p:spPr>
+            <a:xfrm>
+              <a:off x="924348" y="3378523"/>
               <a:ext cx="34794" cy="0"/>
             </a:xfrm>
             <a:custGeom>
@@ -5992,13 +5908,13 @@
         </p:sp>
         <p:sp>
           <p:nvSpPr>
-            <p:cNvPr id="71" name="pl68"/>
-            <p:cNvSpPr/>
-            <p:nvPr/>
-          </p:nvSpPr>
-          <p:spPr>
-            <a:xfrm>
-              <a:off x="924348" y="2489525"/>
+            <p:cNvPr id="68" name="pl67"/>
+            <p:cNvSpPr/>
+            <p:nvPr/>
+          </p:nvSpPr>
+          <p:spPr>
+            <a:xfrm>
+              <a:off x="924348" y="2489508"/>
               <a:ext cx="34794" cy="0"/>
             </a:xfrm>
             <a:custGeom>
@@ -6032,7 +5948,7 @@
         </p:sp>
         <p:sp>
           <p:nvSpPr>
-            <p:cNvPr id="72" name="pl69"/>
+            <p:cNvPr id="69" name="pl68"/>
             <p:cNvSpPr/>
             <p:nvPr/>
           </p:nvSpPr>
@@ -6072,13 +5988,13 @@
         </p:sp>
         <p:sp>
           <p:nvSpPr>
-            <p:cNvPr id="73" name="pl70"/>
-            <p:cNvSpPr/>
-            <p:nvPr/>
-          </p:nvSpPr>
-          <p:spPr>
-            <a:xfrm>
-              <a:off x="2626702" y="6183452"/>
+            <p:cNvPr id="70" name="pl69"/>
+            <p:cNvSpPr/>
+            <p:nvPr/>
+          </p:nvSpPr>
+          <p:spPr>
+            <a:xfrm>
+              <a:off x="2626702" y="6183365"/>
               <a:ext cx="0" cy="34794"/>
             </a:xfrm>
             <a:custGeom>
@@ -6112,13 +6028,13 @@
         </p:sp>
         <p:sp>
           <p:nvSpPr>
-            <p:cNvPr id="74" name="pl71"/>
-            <p:cNvSpPr/>
-            <p:nvPr/>
-          </p:nvSpPr>
-          <p:spPr>
-            <a:xfrm>
-              <a:off x="5069834" y="6183452"/>
+            <p:cNvPr id="71" name="pl70"/>
+            <p:cNvSpPr/>
+            <p:nvPr/>
+          </p:nvSpPr>
+          <p:spPr>
+            <a:xfrm>
+              <a:off x="5069834" y="6183365"/>
               <a:ext cx="0" cy="34794"/>
             </a:xfrm>
             <a:custGeom>
@@ -6152,13 +6068,13 @@
         </p:sp>
         <p:sp>
           <p:nvSpPr>
-            <p:cNvPr id="75" name="pl72"/>
-            <p:cNvSpPr/>
-            <p:nvPr/>
-          </p:nvSpPr>
-          <p:spPr>
-            <a:xfrm>
-              <a:off x="7512966" y="6183452"/>
+            <p:cNvPr id="72" name="pl71"/>
+            <p:cNvSpPr/>
+            <p:nvPr/>
+          </p:nvSpPr>
+          <p:spPr>
+            <a:xfrm>
+              <a:off x="7512966" y="6183365"/>
               <a:ext cx="0" cy="34794"/>
             </a:xfrm>
             <a:custGeom>
@@ -6192,13 +6108,13 @@
         </p:sp>
         <p:sp>
           <p:nvSpPr>
-            <p:cNvPr id="76" name="pl73"/>
-            <p:cNvSpPr/>
-            <p:nvPr/>
-          </p:nvSpPr>
-          <p:spPr>
-            <a:xfrm>
-              <a:off x="9956098" y="6183452"/>
+            <p:cNvPr id="73" name="pl72"/>
+            <p:cNvSpPr/>
+            <p:nvPr/>
+          </p:nvSpPr>
+          <p:spPr>
+            <a:xfrm>
+              <a:off x="9956098" y="6183365"/>
               <a:ext cx="0" cy="34794"/>
             </a:xfrm>
             <a:custGeom>
@@ -6232,13 +6148,13 @@
         </p:sp>
         <p:sp>
           <p:nvSpPr>
-            <p:cNvPr id="77" name="tx74"/>
-            <p:cNvSpPr/>
-            <p:nvPr/>
-          </p:nvSpPr>
-          <p:spPr>
-            <a:xfrm>
-              <a:off x="2595624" y="6247829"/>
+            <p:cNvPr id="74" name="tx73"/>
+            <p:cNvSpPr/>
+            <p:nvPr/>
+          </p:nvSpPr>
+          <p:spPr>
+            <a:xfrm>
+              <a:off x="2595624" y="6247742"/>
               <a:ext cx="62155" cy="78417"/>
             </a:xfrm>
             <a:prstGeom prst="rect">
@@ -6278,13 +6194,13 @@
         </p:sp>
         <p:sp>
           <p:nvSpPr>
-            <p:cNvPr id="78" name="tx75"/>
-            <p:cNvSpPr/>
-            <p:nvPr/>
-          </p:nvSpPr>
-          <p:spPr>
-            <a:xfrm>
-              <a:off x="5038756" y="6245864"/>
+            <p:cNvPr id="75" name="tx74"/>
+            <p:cNvSpPr/>
+            <p:nvPr/>
+          </p:nvSpPr>
+          <p:spPr>
+            <a:xfrm>
+              <a:off x="5038756" y="6245777"/>
               <a:ext cx="62155" cy="80382"/>
             </a:xfrm>
             <a:prstGeom prst="rect">
@@ -6324,13 +6240,13 @@
         </p:sp>
         <p:sp>
           <p:nvSpPr>
-            <p:cNvPr id="79" name="tx76"/>
-            <p:cNvSpPr/>
-            <p:nvPr/>
-          </p:nvSpPr>
-          <p:spPr>
-            <a:xfrm>
-              <a:off x="7481888" y="6247883"/>
+            <p:cNvPr id="76" name="tx75"/>
+            <p:cNvSpPr/>
+            <p:nvPr/>
+          </p:nvSpPr>
+          <p:spPr>
+            <a:xfrm>
+              <a:off x="7481888" y="6247796"/>
               <a:ext cx="62155" cy="78362"/>
             </a:xfrm>
             <a:prstGeom prst="rect">
@@ -6370,13 +6286,13 @@
         </p:sp>
         <p:sp>
           <p:nvSpPr>
-            <p:cNvPr id="80" name="tx77"/>
-            <p:cNvSpPr/>
-            <p:nvPr/>
-          </p:nvSpPr>
-          <p:spPr>
-            <a:xfrm>
-              <a:off x="9925020" y="6247447"/>
+            <p:cNvPr id="77" name="tx76"/>
+            <p:cNvSpPr/>
+            <p:nvPr/>
+          </p:nvSpPr>
+          <p:spPr>
+            <a:xfrm>
+              <a:off x="9925020" y="6247360"/>
               <a:ext cx="62155" cy="78799"/>
             </a:xfrm>
             <a:prstGeom prst="rect">
@@ -6416,13 +6332,13 @@
         </p:sp>
         <p:sp>
           <p:nvSpPr>
-            <p:cNvPr id="81" name="tx78"/>
-            <p:cNvSpPr/>
-            <p:nvPr/>
-          </p:nvSpPr>
-          <p:spPr>
-            <a:xfrm>
-              <a:off x="6144592" y="6391355"/>
+            <p:cNvPr id="78" name="tx77"/>
+            <p:cNvSpPr/>
+            <p:nvPr/>
+          </p:nvSpPr>
+          <p:spPr>
+            <a:xfrm>
+              <a:off x="6144592" y="6391268"/>
               <a:ext cx="139700" cy="94611"/>
             </a:xfrm>
             <a:prstGeom prst="rect">
@@ -6462,13 +6378,13 @@
         </p:sp>
         <p:sp>
           <p:nvSpPr>
-            <p:cNvPr id="82" name="tx79"/>
+            <p:cNvPr id="79" name="tx78"/>
             <p:cNvSpPr/>
             <p:nvPr/>
           </p:nvSpPr>
           <p:spPr>
             <a:xfrm rot="-5400000">
-              <a:off x="517761" y="3832440"/>
+              <a:off x="517761" y="3832397"/>
               <a:ext cx="271760" cy="105729"/>
             </a:xfrm>
             <a:prstGeom prst="rect">
@@ -6507,6 +6423,61 @@
           </p:txBody>
         </p:sp>
       </p:grpSp>
+      <p:sp>
+        <p:nvSpPr>
+          <p:cNvPr id="80" name="Title 1"/>
+          <p:cNvSpPr>
+            <a:spLocks noGrp="1"/>
+          </p:cNvSpPr>
+          <p:nvPr>
+            <p:ph type="title" hasCustomPrompt="1"/>
+          </p:nvPr>
+        </p:nvSpPr>
+        <p:spPr>
+          <a:xfrm>
+            <a:off x="385482" y="367368"/>
+            <a:ext cx="9637060" cy="540145"/>
+          </a:xfrm>
+        </p:spPr>
+        <p:txBody>
+          <a:bodyPr/>
+          <a:lstStyle/>
+          <a:p>
+            <a:r>
+              <a:rPr/>
+              <a:t>My title</a:t>
+            </a:r>
+          </a:p>
+        </p:txBody>
+      </p:sp>
+      <p:sp>
+        <p:nvSpPr>
+          <p:cNvPr id="81" name="Caption Placeholder 1"/>
+          <p:cNvSpPr>
+            <a:spLocks noGrp="1"/>
+          </p:cNvSpPr>
+          <p:nvPr>
+            <p:ph type="body" sz="quarter" idx="11" hasCustomPrompt="1"/>
+          </p:nvPr>
+        </p:nvSpPr>
+        <p:spPr>
+          <a:xfrm>
+            <a:off x="371474" y="6586456"/>
+            <a:ext cx="11412539" cy="228206"/>
+          </a:xfrm>
+        </p:spPr>
+        <p:txBody>
+          <a:bodyPr/>
+          <a:lstStyle/>
+          <a:p>
+            <a:r>
+              <a:rPr/>
+              <a:t>Notes: notes. 
+Source: source</a:t>
+            </a:r>
+          </a:p>
+        </p:txBody>
+      </p:sp>
     </p:spTree>
   </p:cSld>
   <p:clrMapOvr>

</xml_diff>